<commit_message>
Updated animal weights pratice worksheet
</commit_message>
<xml_diff>
--- a/workshop4_voter_turnout/workshop4_presentation.pptx
+++ b/workshop4_voter_turnout/workshop4_presentation.pptx
@@ -112,6 +112,11 @@
       </a:defRPr>
     </a:lvl9pPr>
   </p:defaultTextStyle>
+  <p:extLst>
+    <p:ext uri="{EFAFB233-063F-42B5-8137-9DF3F51BA10A}">
+      <p15:sldGuideLst xmlns:p15="http://schemas.microsoft.com/office/powerpoint/2012/main"/>
+    </p:ext>
+  </p:extLst>
 </p:presentation>
 </file>
 
@@ -262,7 +267,7 @@
           <a:p>
             <a:fld id="{C4FD8BA4-23A0-6A49-916C-C3F9B2CD3215}" type="datetimeFigureOut">
               <a:rPr lang="en-US" smtClean="0"/>
-              <a:t>4/30/20</a:t>
+              <a:t>11/19/20</a:t>
             </a:fld>
             <a:endParaRPr lang="en-US"/>
           </a:p>
@@ -460,7 +465,7 @@
           <a:p>
             <a:fld id="{C4FD8BA4-23A0-6A49-916C-C3F9B2CD3215}" type="datetimeFigureOut">
               <a:rPr lang="en-US" smtClean="0"/>
-              <a:t>4/30/20</a:t>
+              <a:t>11/19/20</a:t>
             </a:fld>
             <a:endParaRPr lang="en-US"/>
           </a:p>
@@ -668,7 +673,7 @@
           <a:p>
             <a:fld id="{C4FD8BA4-23A0-6A49-916C-C3F9B2CD3215}" type="datetimeFigureOut">
               <a:rPr lang="en-US" smtClean="0"/>
-              <a:t>4/30/20</a:t>
+              <a:t>11/19/20</a:t>
             </a:fld>
             <a:endParaRPr lang="en-US"/>
           </a:p>
@@ -866,7 +871,7 @@
           <a:p>
             <a:fld id="{C4FD8BA4-23A0-6A49-916C-C3F9B2CD3215}" type="datetimeFigureOut">
               <a:rPr lang="en-US" smtClean="0"/>
-              <a:t>4/30/20</a:t>
+              <a:t>11/19/20</a:t>
             </a:fld>
             <a:endParaRPr lang="en-US"/>
           </a:p>
@@ -1141,7 +1146,7 @@
           <a:p>
             <a:fld id="{C4FD8BA4-23A0-6A49-916C-C3F9B2CD3215}" type="datetimeFigureOut">
               <a:rPr lang="en-US" smtClean="0"/>
-              <a:t>4/30/20</a:t>
+              <a:t>11/19/20</a:t>
             </a:fld>
             <a:endParaRPr lang="en-US"/>
           </a:p>
@@ -1406,7 +1411,7 @@
           <a:p>
             <a:fld id="{C4FD8BA4-23A0-6A49-916C-C3F9B2CD3215}" type="datetimeFigureOut">
               <a:rPr lang="en-US" smtClean="0"/>
-              <a:t>4/30/20</a:t>
+              <a:t>11/19/20</a:t>
             </a:fld>
             <a:endParaRPr lang="en-US"/>
           </a:p>
@@ -1818,7 +1823,7 @@
           <a:p>
             <a:fld id="{C4FD8BA4-23A0-6A49-916C-C3F9B2CD3215}" type="datetimeFigureOut">
               <a:rPr lang="en-US" smtClean="0"/>
-              <a:t>4/30/20</a:t>
+              <a:t>11/19/20</a:t>
             </a:fld>
             <a:endParaRPr lang="en-US"/>
           </a:p>
@@ -1959,7 +1964,7 @@
           <a:p>
             <a:fld id="{C4FD8BA4-23A0-6A49-916C-C3F9B2CD3215}" type="datetimeFigureOut">
               <a:rPr lang="en-US" smtClean="0"/>
-              <a:t>4/30/20</a:t>
+              <a:t>11/19/20</a:t>
             </a:fld>
             <a:endParaRPr lang="en-US"/>
           </a:p>
@@ -2072,7 +2077,7 @@
           <a:p>
             <a:fld id="{C4FD8BA4-23A0-6A49-916C-C3F9B2CD3215}" type="datetimeFigureOut">
               <a:rPr lang="en-US" smtClean="0"/>
-              <a:t>4/30/20</a:t>
+              <a:t>11/19/20</a:t>
             </a:fld>
             <a:endParaRPr lang="en-US"/>
           </a:p>
@@ -2383,7 +2388,7 @@
           <a:p>
             <a:fld id="{C4FD8BA4-23A0-6A49-916C-C3F9B2CD3215}" type="datetimeFigureOut">
               <a:rPr lang="en-US" smtClean="0"/>
-              <a:t>4/30/20</a:t>
+              <a:t>11/19/20</a:t>
             </a:fld>
             <a:endParaRPr lang="en-US"/>
           </a:p>
@@ -2671,7 +2676,7 @@
           <a:p>
             <a:fld id="{C4FD8BA4-23A0-6A49-916C-C3F9B2CD3215}" type="datetimeFigureOut">
               <a:rPr lang="en-US" smtClean="0"/>
-              <a:t>4/30/20</a:t>
+              <a:t>11/19/20</a:t>
             </a:fld>
             <a:endParaRPr lang="en-US"/>
           </a:p>
@@ -2912,7 +2917,7 @@
           <a:p>
             <a:fld id="{C4FD8BA4-23A0-6A49-916C-C3F9B2CD3215}" type="datetimeFigureOut">
               <a:rPr lang="en-US" smtClean="0"/>
-              <a:t>4/30/20</a:t>
+              <a:t>11/19/20</a:t>
             </a:fld>
             <a:endParaRPr lang="en-US"/>
           </a:p>

</xml_diff>